<commit_message>
Fix: equation in presentation
</commit_message>
<xml_diff>
--- a/Seminar 9 - Burgers equation/seminar_9.pptx
+++ b/Seminar 9 - Burgers equation/seminar_9.pptx
@@ -14275,7 +14275,7 @@
                       <a:rPr lang="en-US" b="0" i="1" smtClean="0">
                         <a:latin typeface="Cambria Math" panose="02040503050406030204" pitchFamily="18" charset="0"/>
                       </a:rPr>
-                      <m:t>=</m:t>
+                      <m:t>=−</m:t>
                     </m:r>
                     <m:sSub>
                       <m:sSubPr>
@@ -14585,7 +14585,7 @@
                       <a:rPr lang="en-US" b="0" i="1" smtClean="0">
                         <a:latin typeface="Cambria Math" panose="02040503050406030204" pitchFamily="18" charset="0"/>
                       </a:rPr>
-                      <m:t>=</m:t>
+                      <m:t>=−</m:t>
                     </m:r>
                     <m:sSub>
                       <m:sSubPr>
@@ -15589,13 +15589,7 @@
                                       <a:rPr lang="en-US" sz="1200" i="1">
                                         <a:latin typeface="Cambria Math" panose="02040503050406030204" pitchFamily="18" charset="0"/>
                                       </a:rPr>
-                                      <m:t>+</m:t>
-                                    </m:r>
-                                    <m:r>
-                                      <a:rPr lang="en-US" sz="1200" i="1">
-                                        <a:latin typeface="Cambria Math" panose="02040503050406030204" pitchFamily="18" charset="0"/>
-                                      </a:rPr>
-                                      <m:t>1</m:t>
+                                      <m:t>+1</m:t>
                                     </m:r>
                                   </m:sub>
                                   <m:sup>
@@ -16920,8 +16914,8 @@
           </a:prstGeom>
         </p:spPr>
       </p:pic>
-      <mc:AlternateContent xmlns:mc="http://schemas.openxmlformats.org/markup-compatibility/2006">
-        <mc:Choice xmlns:a14="http://schemas.microsoft.com/office/drawing/2010/main" Requires="a14">
+      <mc:AlternateContent xmlns:mc="http://schemas.openxmlformats.org/markup-compatibility/2006" xmlns:a14="http://schemas.microsoft.com/office/drawing/2010/main">
+        <mc:Choice Requires="a14">
           <p:graphicFrame>
             <p:nvGraphicFramePr>
               <p:cNvPr id="12" name="Table 12">
@@ -17014,6 +17008,7 @@
                         <a:bodyPr/>
                         <a:lstStyle/>
                         <a:p>
+                          <a:pPr/>
                           <a14:m>
                             <m:oMathPara xmlns:m="http://schemas.openxmlformats.org/officeDocument/2006/math">
                               <m:oMathParaPr>
@@ -17039,6 +17034,7 @@
                         <a:bodyPr/>
                         <a:lstStyle/>
                         <a:p>
+                          <a:pPr/>
                           <a14:m>
                             <m:oMathPara xmlns:m="http://schemas.openxmlformats.org/officeDocument/2006/math">
                               <m:oMathParaPr>
@@ -17064,6 +17060,7 @@
                         <a:bodyPr/>
                         <a:lstStyle/>
                         <a:p>
+                          <a:pPr/>
                           <a14:m>
                             <m:oMathPara xmlns:m="http://schemas.openxmlformats.org/officeDocument/2006/math">
                               <m:oMathParaPr>
@@ -17128,6 +17125,7 @@
                         <a:bodyPr/>
                         <a:lstStyle/>
                         <a:p>
+                          <a:pPr/>
                           <a14:m>
                             <m:oMathPara xmlns:m="http://schemas.openxmlformats.org/officeDocument/2006/math">
                               <m:oMathParaPr>
@@ -17153,6 +17151,7 @@
                         <a:bodyPr/>
                         <a:lstStyle/>
                         <a:p>
+                          <a:pPr/>
                           <a14:m>
                             <m:oMathPara xmlns:m="http://schemas.openxmlformats.org/officeDocument/2006/math">
                               <m:oMathParaPr>
@@ -17178,6 +17177,7 @@
                         <a:bodyPr/>
                         <a:lstStyle/>
                         <a:p>
+                          <a:pPr/>
                           <a14:m>
                             <m:oMathPara xmlns:m="http://schemas.openxmlformats.org/officeDocument/2006/math">
                               <m:oMathParaPr>
@@ -17209,7 +17209,7 @@
             </a:graphic>
           </p:graphicFrame>
         </mc:Choice>
-        <mc:Fallback>
+        <mc:Fallback xmlns="">
           <p:graphicFrame>
             <p:nvGraphicFramePr>
               <p:cNvPr id="12" name="Table 12">
@@ -18076,18 +18076,18 @@
 </file>
 
 <file path=customXml/item1.xml><?xml version="1.0" encoding="utf-8"?>
-<p:properties xmlns:p="http://schemas.microsoft.com/office/2006/metadata/properties" xmlns:xsi="http://www.w3.org/2001/XMLSchema-instance" xmlns:pc="http://schemas.microsoft.com/office/infopath/2007/PartnerControls">
-  <documentManagement/>
-</p:properties>
-</file>
-
-<file path=customXml/item2.xml><?xml version="1.0" encoding="utf-8"?>
 <?mso-contentType ?>
 <FormTemplates xmlns="http://schemas.microsoft.com/sharepoint/v3/contenttype/forms">
   <Display>DocumentLibraryForm</Display>
   <Edit>DocumentLibraryForm</Edit>
   <New>DocumentLibraryForm</New>
 </FormTemplates>
+</file>
+
+<file path=customXml/item2.xml><?xml version="1.0" encoding="utf-8"?>
+<p:properties xmlns:p="http://schemas.microsoft.com/office/2006/metadata/properties" xmlns:xsi="http://www.w3.org/2001/XMLSchema-instance" xmlns:pc="http://schemas.microsoft.com/office/infopath/2007/PartnerControls">
+  <documentManagement/>
+</p:properties>
 </file>
 
 <file path=customXml/item3.xml><?xml version="1.0" encoding="utf-8"?>
@@ -18314,6 +18314,14 @@
 </file>
 
 <file path=customXml/itemProps1.xml><?xml version="1.0" encoding="utf-8"?>
+<ds:datastoreItem xmlns:ds="http://schemas.openxmlformats.org/officeDocument/2006/customXml" ds:itemID="{B34386AA-1848-4C75-B336-1053927CB025}">
+  <ds:schemaRefs>
+    <ds:schemaRef ds:uri="http://schemas.microsoft.com/sharepoint/v3/contenttype/forms"/>
+  </ds:schemaRefs>
+</ds:datastoreItem>
+</file>
+
+<file path=customXml/itemProps2.xml><?xml version="1.0" encoding="utf-8"?>
 <ds:datastoreItem xmlns:ds="http://schemas.openxmlformats.org/officeDocument/2006/customXml" ds:itemID="{433DAF31-D8A6-49A0-9A5D-8B2EA5B1C511}">
   <ds:schemaRefs>
     <ds:schemaRef ds:uri="http://purl.org/dc/elements/1.1/"/>
@@ -18326,14 +18334,6 @@
     <ds:schemaRef ds:uri="http://www.w3.org/XML/1998/namespace"/>
     <ds:schemaRef ds:uri="http://schemas.openxmlformats.org/package/2006/metadata/core-properties"/>
     <ds:schemaRef ds:uri="9875bd71-cde8-496c-a136-433f55d5e6d0"/>
-  </ds:schemaRefs>
-</ds:datastoreItem>
-</file>
-
-<file path=customXml/itemProps2.xml><?xml version="1.0" encoding="utf-8"?>
-<ds:datastoreItem xmlns:ds="http://schemas.openxmlformats.org/officeDocument/2006/customXml" ds:itemID="{B34386AA-1848-4C75-B336-1053927CB025}">
-  <ds:schemaRefs>
-    <ds:schemaRef ds:uri="http://schemas.microsoft.com/sharepoint/v3/contenttype/forms"/>
   </ds:schemaRefs>
 </ds:datastoreItem>
 </file>

</xml_diff>